<commit_message>
Fine tuning for slides 3-1
</commit_message>
<xml_diff>
--- a/slides/Tag-3_1-GitOps_Light.pptx
+++ b/slides/Tag-3_1-GitOps_Light.pptx
@@ -3108,18 +3108,9 @@
           <a:lstStyle/>
           <a:p>
             <a:r>
-              <a:rPr lang="de-DE" dirty="0" err="1"/>
-              <a:t>Infra</a:t>
-            </a:r>
-            <a:r>
               <a:rPr lang="de-DE" dirty="0"/>
-              <a:t> </a:t>
-            </a:r>
-            <a:r>
-              <a:rPr lang="de-DE" dirty="0" err="1"/>
-              <a:t>operator</a:t>
-            </a:r>
-            <a:endParaRPr lang="de-DE" dirty="0"/>
+              <a:t>API Server</a:t>
+            </a:r>
           </a:p>
           <a:p>
             <a:r>
@@ -4128,138 +4119,7 @@
           <a:bodyPr/>
           <a:lstStyle/>
           <a:p>
-            <a:r>
-              <a:rPr lang="de-DE" dirty="0"/>
-              <a:t>Vorteile:</a:t>
-            </a:r>
-          </a:p>
-          <a:p>
-            <a:pPr marL="171450" indent="-171450">
-              <a:buFont typeface="Arial" panose="020B0604020202020204" pitchFamily="34" charset="0"/>
-              <a:buChar char="•"/>
-            </a:pPr>
-            <a:r>
-              <a:rPr lang="de-DE" dirty="0"/>
-              <a:t>Einzelnes Repo für die Entwicklung! (Höhere Effizienz)</a:t>
-            </a:r>
-          </a:p>
-          <a:p>
-            <a:pPr marL="171450" indent="-171450">
-              <a:buFont typeface="Arial" panose="020B0604020202020204" pitchFamily="34" charset="0"/>
-              <a:buChar char="•"/>
-            </a:pPr>
-            <a:r>
-              <a:rPr lang="de-DE" dirty="0"/>
-              <a:t>Automatisiertes </a:t>
-            </a:r>
-            <a:r>
-              <a:rPr lang="de-DE" dirty="0" err="1"/>
-              <a:t>Staging</a:t>
-            </a:r>
-            <a:r>
-              <a:rPr lang="de-DE" dirty="0"/>
-              <a:t> möglich (pull </a:t>
-            </a:r>
-            <a:r>
-              <a:rPr lang="de-DE" dirty="0" err="1"/>
-              <a:t>request</a:t>
-            </a:r>
-            <a:r>
-              <a:rPr lang="de-DE" dirty="0"/>
-              <a:t> Erzeugung, Namespaces)</a:t>
-            </a:r>
-          </a:p>
-          <a:p>
-            <a:pPr marL="171450" indent="-171450">
-              <a:buFont typeface="Arial" panose="020B0604020202020204" pitchFamily="34" charset="0"/>
-              <a:buChar char="•"/>
-            </a:pPr>
-            <a:r>
-              <a:rPr lang="de-DE" dirty="0"/>
-              <a:t>Shift-</a:t>
-            </a:r>
-            <a:r>
-              <a:rPr lang="de-DE" dirty="0" err="1"/>
-              <a:t>Left</a:t>
-            </a:r>
-            <a:r>
-              <a:rPr lang="de-DE" dirty="0"/>
-              <a:t>-Ansatz möglich! (Tests, Lint, Policy Check, ….)</a:t>
-            </a:r>
-          </a:p>
-          <a:p>
-            <a:pPr marL="628650" lvl="1" indent="-171450">
-              <a:buFont typeface="Arial" panose="020B0604020202020204" pitchFamily="34" charset="0"/>
-              <a:buChar char="•"/>
-            </a:pPr>
-            <a:r>
-              <a:rPr lang="de-DE" dirty="0"/>
-              <a:t>mit </a:t>
-            </a:r>
-            <a:r>
-              <a:rPr lang="de-DE" dirty="0" err="1"/>
-              <a:t>yamlint</a:t>
-            </a:r>
-            <a:r>
-              <a:rPr lang="de-DE" dirty="0"/>
-              <a:t>, </a:t>
-            </a:r>
-            <a:r>
-              <a:rPr lang="de-DE" dirty="0" err="1"/>
-              <a:t>kubeval</a:t>
-            </a:r>
-            <a:r>
-              <a:rPr lang="de-DE" dirty="0"/>
-              <a:t>, </a:t>
-            </a:r>
-            <a:r>
-              <a:rPr lang="de-DE" dirty="0" err="1"/>
-              <a:t>helm</a:t>
-            </a:r>
-            <a:r>
-              <a:rPr lang="de-DE" dirty="0"/>
-              <a:t> </a:t>
-            </a:r>
-            <a:r>
-              <a:rPr lang="de-DE" dirty="0" err="1"/>
-              <a:t>lint</a:t>
-            </a:r>
-            <a:r>
-              <a:rPr lang="de-DE" dirty="0"/>
-              <a:t>, </a:t>
-            </a:r>
-            <a:r>
-              <a:rPr lang="de-DE" dirty="0" err="1"/>
-              <a:t>conftest</a:t>
-            </a:r>
             <a:endParaRPr lang="de-DE" dirty="0"/>
-          </a:p>
-          <a:p>
-            <a:pPr marL="171450" indent="-171450">
-              <a:buFont typeface="Arial" panose="020B0604020202020204" pitchFamily="34" charset="0"/>
-              <a:buChar char="•"/>
-            </a:pPr>
-            <a:endParaRPr lang="de-DE" dirty="0"/>
-          </a:p>
-          <a:p>
-            <a:pPr marL="0" indent="0">
-              <a:buFont typeface="Arial" panose="020B0604020202020204" pitchFamily="34" charset="0"/>
-              <a:buNone/>
-            </a:pPr>
-            <a:r>
-              <a:rPr lang="de-DE" dirty="0"/>
-              <a:t>Nachteile:</a:t>
-            </a:r>
-          </a:p>
-          <a:p>
-            <a:pPr marL="171450" indent="-171450">
-              <a:buFont typeface="Arial" panose="020B0604020202020204" pitchFamily="34" charset="0"/>
-              <a:buChar char="•"/>
-            </a:pPr>
-            <a:r>
-              <a:rPr lang="de-DE" dirty="0"/>
-              <a:t>Komplexität steckt im Detail… Oder eben in den CI Pipelines.</a:t>
-            </a:r>
           </a:p>
         </p:txBody>
       </p:sp>
@@ -5423,7 +5283,7 @@
             </a:pPr>
             <a:r>
               <a:rPr lang="de-DE" dirty="0"/>
-              <a:t>Zu 4. Der CI-Server läuft im vergleich zum </a:t>
+              <a:t>Zu 4. Der CI-Server läuft im Vergleich zum </a:t>
             </a:r>
             <a:r>
               <a:rPr lang="de-DE" dirty="0" err="1"/>
@@ -7029,7 +6889,7 @@
               <a:pPr algn="ctr">
                 <a:defRPr/>
               </a:pPr>
-              <a:t>10.06.2024</a:t>
+              <a:t>12.06.2024</a:t>
             </a:fld>
             <a:endParaRPr lang="de-DE" sz="1000">
               <a:solidFill>
@@ -7413,7 +7273,7 @@
         </p:nvSpPr>
         <p:spPr bwMode="auto">
           <a:xfrm>
-            <a:off x="4252913" y="6424613"/>
+            <a:off x="4001540" y="6451600"/>
             <a:ext cx="1721946" cy="246221"/>
           </a:xfrm>
           <a:prstGeom prst="rect">
@@ -9504,7 +9364,7 @@
             </a:pPr>
             <a:r>
               <a:rPr lang="de-DE" altLang="de-DE" dirty="0"/>
-              <a:t>Softwareentwicklungs-Lebenszyklus größtenteils automatisiert</a:t>
+              <a:t>Softwareentwicklungs-Lebenszyklus automatisiert</a:t>
             </a:r>
           </a:p>
           <a:p>
@@ -9514,24 +9374,25 @@
             </a:pPr>
             <a:r>
               <a:rPr lang="de-DE" altLang="de-DE" sz="1900" dirty="0"/>
-              <a:t>Infrastruktur weitestgehend manuell</a:t>
-            </a:r>
-          </a:p>
-          <a:p>
-            <a:pPr lvl="2">
+              <a:t>Infrastruktur weitgehend manuell </a:t>
+            </a:r>
+            <a:r>
+              <a:rPr lang="de-DE" altLang="de-DE" sz="1700" dirty="0">
+                <a:sym typeface="Wingdings" panose="05000000000000000000" pitchFamily="2" charset="2"/>
+              </a:rPr>
+              <a:t></a:t>
+            </a:r>
+            <a:r>
+              <a:rPr lang="de-DE" altLang="de-DE" sz="1700" dirty="0"/>
+              <a:t> benötigt spezialisierte Teams</a:t>
+            </a:r>
+          </a:p>
+          <a:p>
+            <a:pPr lvl="1">
               <a:buFont typeface="Arial" panose="020B0604020202020204" pitchFamily="34" charset="0"/>
               <a:buChar char="•"/>
             </a:pPr>
-            <a:r>
-              <a:rPr lang="de-DE" altLang="de-DE" sz="1700" dirty="0">
-                <a:sym typeface="Wingdings" panose="05000000000000000000" pitchFamily="2" charset="2"/>
-              </a:rPr>
-              <a:t></a:t>
-            </a:r>
-            <a:r>
-              <a:rPr lang="de-DE" altLang="de-DE" sz="1700" dirty="0"/>
-              <a:t> Benötigt spezialisierte Teams</a:t>
-            </a:r>
+            <a:endParaRPr lang="de-DE" altLang="de-DE" sz="1700" dirty="0"/>
           </a:p>
           <a:p>
             <a:pPr>
@@ -9540,7 +9401,7 @@
             </a:pPr>
             <a:r>
               <a:rPr lang="de-DE" altLang="de-DE" dirty="0"/>
-              <a:t>Moderne Cloud-native Anwendungen auf Geschwindigkeit und Skalierbarkeit ausgerichtet</a:t>
+              <a:t>Cloud Native Apps</a:t>
             </a:r>
           </a:p>
           <a:p>
@@ -9549,9 +9410,26 @@
               <a:buChar char="•"/>
             </a:pPr>
             <a:r>
+              <a:rPr lang="de-DE" altLang="de-DE" dirty="0"/>
+              <a:t>Fokus auf Geschwindigkeit und Skalierbarkeit</a:t>
+            </a:r>
+          </a:p>
+          <a:p>
+            <a:pPr lvl="1">
+              <a:buFont typeface="Arial" panose="020B0604020202020204" pitchFamily="34" charset="0"/>
+              <a:buChar char="•"/>
+            </a:pPr>
+            <a:r>
               <a:rPr lang="de-DE" altLang="de-DE" sz="1900" dirty="0"/>
               <a:t>Trend: Infrastruktur in die Cloud </a:t>
             </a:r>
+          </a:p>
+          <a:p>
+            <a:pPr lvl="1">
+              <a:buFont typeface="Arial" panose="020B0604020202020204" pitchFamily="34" charset="0"/>
+              <a:buChar char="•"/>
+            </a:pPr>
+            <a:endParaRPr lang="de-DE" altLang="de-DE" sz="1900" dirty="0"/>
           </a:p>
           <a:p>
             <a:pPr>
@@ -9560,7 +9438,7 @@
             </a:pPr>
             <a:r>
               <a:rPr lang="de-DE" altLang="de-DE" dirty="0"/>
-              <a:t>Ziel: Infrastruktur-Bereitstellung automatisieren</a:t>
+              <a:t>Ziel: Infrastruktur-Provisionierung automatisieren</a:t>
             </a:r>
           </a:p>
           <a:p>
@@ -9569,8 +9447,12 @@
               <a:buChar char="•"/>
             </a:pPr>
             <a:r>
+              <a:rPr lang="de-DE" altLang="de-DE" sz="1900" dirty="0" err="1"/>
+              <a:t>Operations</a:t>
+            </a:r>
+            <a:r>
               <a:rPr lang="de-DE" altLang="de-DE" sz="1900" dirty="0"/>
-              <a:t>Operations-Teams nutzen Konfigurationsdateien als Code</a:t>
+              <a:t> nutzt Konfigurationsdateien als Code</a:t>
             </a:r>
           </a:p>
           <a:p>
@@ -9586,7 +9468,7 @@
             </a:r>
             <a:r>
               <a:rPr lang="de-DE" altLang="de-DE" sz="1900" dirty="0"/>
-              <a:t>garantieren konsistente Infrastruktur; analog Softwarecode konsistente Binärdateien</a:t>
+              <a:t>Konsistente Infrastruktur; analog Softwarecode (konsistente Binärdateien)</a:t>
             </a:r>
           </a:p>
           <a:p>
@@ -9726,7 +9608,7 @@
               <a:t>Infrastruktur als Code (</a:t>
             </a:r>
             <a:r>
-              <a:rPr lang="de-DE" dirty="0" err="1"/>
+              <a:rPr lang="de-DE" b="1" dirty="0" err="1"/>
               <a:t>IaC</a:t>
             </a:r>
             <a:r>
@@ -9739,6 +9621,13 @@
               <a:buFont typeface="Arial" panose="020B0604020202020204" pitchFamily="34" charset="0"/>
               <a:buChar char="•"/>
             </a:pPr>
+            <a:endParaRPr lang="de-DE" dirty="0"/>
+          </a:p>
+          <a:p>
+            <a:pPr>
+              <a:buFont typeface="Arial" panose="020B0604020202020204" pitchFamily="34" charset="0"/>
+              <a:buChar char="•"/>
+            </a:pPr>
             <a:r>
               <a:rPr lang="de-DE" dirty="0"/>
               <a:t>Vorgehen:</a:t>
@@ -9772,6 +9661,13 @@
             </a:r>
           </a:p>
           <a:p>
+            <a:pPr lvl="1">
+              <a:buFont typeface="Arial" panose="020B0604020202020204" pitchFamily="34" charset="0"/>
+              <a:buChar char="•"/>
+            </a:pPr>
+            <a:endParaRPr lang="de-DE" dirty="0"/>
+          </a:p>
+          <a:p>
             <a:pPr>
               <a:buFont typeface="Arial" panose="020B0604020202020204" pitchFamily="34" charset="0"/>
               <a:buChar char="•"/>
@@ -9811,6 +9707,18 @@
                 <a:sym typeface="Wingdings" panose="05000000000000000000" pitchFamily="2" charset="2"/>
               </a:rPr>
               <a:t> Rollbacks möglich</a:t>
+            </a:r>
+          </a:p>
+          <a:p>
+            <a:pPr lvl="1">
+              <a:buFont typeface="Arial" panose="020B0604020202020204" pitchFamily="34" charset="0"/>
+              <a:buChar char="•"/>
+            </a:pPr>
+            <a:r>
+              <a:rPr lang="de-DE" dirty="0">
+                <a:sym typeface="Wingdings" panose="05000000000000000000" pitchFamily="2" charset="2"/>
+              </a:rPr>
+              <a:t> Nachweisbarkeit gegeben</a:t>
             </a:r>
             <a:endParaRPr lang="de-DE" dirty="0"/>
           </a:p>
@@ -9911,7 +9819,7 @@
             </a:pPr>
             <a:r>
               <a:rPr lang="de-DE" dirty="0"/>
-              <a:t>Workflow für Anwendungsentwicklung</a:t>
+              <a:t>Workflow für Anwendungsbereitstellung</a:t>
             </a:r>
           </a:p>
           <a:p>
@@ -9965,7 +9873,7 @@
             </a:r>
             <a:r>
               <a:rPr lang="de-DE" dirty="0"/>
-              <a:t> um ein </a:t>
+              <a:t>, um ein </a:t>
             </a:r>
             <a:r>
               <a:rPr lang="de-DE" dirty="0" err="1"/>
@@ -9973,7 +9881,7 @@
             </a:r>
             <a:r>
               <a:rPr lang="de-DE" dirty="0"/>
-              <a:t>-Framework aufzubauen</a:t>
+              <a:t> Framework aufzubauen</a:t>
             </a:r>
           </a:p>
           <a:p>
@@ -9998,7 +9906,7 @@
             </a:r>
             <a:r>
               <a:rPr lang="de-DE" dirty="0" err="1"/>
-              <a:t>cicleci</a:t>
+              <a:t>circleci</a:t>
             </a:r>
             <a:r>
               <a:rPr lang="de-DE" dirty="0"/>
@@ -10030,12 +9938,8 @@
               <a:buChar char="•"/>
             </a:pPr>
             <a:r>
-              <a:rPr lang="de-DE" dirty="0" err="1"/>
-              <a:t>Konfiugrationsmanagementtools</a:t>
-            </a:r>
-            <a:r>
               <a:rPr lang="de-DE" dirty="0"/>
-              <a:t> (</a:t>
+              <a:t>Konfigurationsmanagement (</a:t>
             </a:r>
             <a:r>
               <a:rPr lang="de-DE" dirty="0" err="1"/>
@@ -10043,7 +9947,7 @@
             </a:r>
             <a:r>
               <a:rPr lang="de-DE" dirty="0"/>
-              <a:t>, Chef, puppet)</a:t>
+              <a:t>, Chef, puppet, Helm)</a:t>
             </a:r>
           </a:p>
           <a:p>
@@ -10422,12 +10326,9 @@
               </a:rPr>
               <a:t>Operations</a:t>
             </a:r>
-            <a:r>
-              <a:rPr lang="de-DE" dirty="0">
-                <a:sym typeface="Wingdings" panose="05000000000000000000" pitchFamily="2" charset="2"/>
-              </a:rPr>
-              <a:t>:</a:t>
-            </a:r>
+            <a:endParaRPr lang="de-DE" dirty="0">
+              <a:sym typeface="Wingdings" panose="05000000000000000000" pitchFamily="2" charset="2"/>
+            </a:endParaRPr>
           </a:p>
           <a:p>
             <a:pPr lvl="1">
@@ -10459,41 +10360,8 @@
               <a:rPr lang="de-DE" dirty="0">
                 <a:sym typeface="Wingdings" panose="05000000000000000000" pitchFamily="2" charset="2"/>
               </a:rPr>
-              <a:t> </a:t>
-            </a:r>
-            <a:r>
-              <a:rPr lang="de-DE" dirty="0" err="1">
-                <a:sym typeface="Wingdings" panose="05000000000000000000" pitchFamily="2" charset="2"/>
-              </a:rPr>
-              <a:t>life</a:t>
-            </a:r>
-            <a:r>
-              <a:rPr lang="de-DE" dirty="0">
-                <a:sym typeface="Wingdings" panose="05000000000000000000" pitchFamily="2" charset="2"/>
-              </a:rPr>
-              <a:t> </a:t>
-            </a:r>
-            <a:r>
-              <a:rPr lang="de-DE" dirty="0" err="1">
-                <a:sym typeface="Wingdings" panose="05000000000000000000" pitchFamily="2" charset="2"/>
-              </a:rPr>
-              <a:t>cycle</a:t>
-            </a:r>
-            <a:r>
-              <a:rPr lang="de-DE" dirty="0">
-                <a:sym typeface="Wingdings" panose="05000000000000000000" pitchFamily="2" charset="2"/>
-              </a:rPr>
-              <a:t> </a:t>
-            </a:r>
-            <a:r>
-              <a:rPr lang="de-DE" dirty="0" err="1">
-                <a:sym typeface="Wingdings" panose="05000000000000000000" pitchFamily="2" charset="2"/>
-              </a:rPr>
-              <a:t>management</a:t>
-            </a:r>
-            <a:endParaRPr lang="de-DE" dirty="0">
-              <a:sym typeface="Wingdings" panose="05000000000000000000" pitchFamily="2" charset="2"/>
-            </a:endParaRPr>
+              <a:t> Life Cycle Management</a:t>
+            </a:r>
           </a:p>
           <a:p>
             <a:pPr lvl="1">
@@ -10510,7 +10378,7 @@
               <a:rPr lang="de-DE" dirty="0" err="1">
                 <a:sym typeface="Wingdings" panose="05000000000000000000" pitchFamily="2" charset="2"/>
               </a:rPr>
-              <a:t>configuration</a:t>
+              <a:t>Configuration</a:t>
             </a:r>
             <a:endParaRPr lang="de-DE" dirty="0">
               <a:sym typeface="Wingdings" panose="05000000000000000000" pitchFamily="2" charset="2"/>
@@ -10688,7 +10556,7 @@
               <a:rPr lang="de-DE" sz="1800" dirty="0">
                 <a:sym typeface="Wingdings" panose="05000000000000000000" pitchFamily="2" charset="2"/>
               </a:rPr>
-              <a:t>Operation-Teams müssen keine Ressourcen zuweisen/genehmigen</a:t>
+              <a:t>Operations-Teams müssen keine Ressourcen zuweisen/genehmigen</a:t>
             </a:r>
           </a:p>
           <a:p>
@@ -10979,7 +10847,19 @@
               <a:rPr lang="de-DE" dirty="0">
                 <a:sym typeface="Wingdings" panose="05000000000000000000" pitchFamily="2" charset="2"/>
               </a:rPr>
-              <a:t> ist kein Muss!</a:t>
+              <a:t> ist </a:t>
+            </a:r>
+            <a:r>
+              <a:rPr lang="de-DE" b="1" dirty="0">
+                <a:sym typeface="Wingdings" panose="05000000000000000000" pitchFamily="2" charset="2"/>
+              </a:rPr>
+              <a:t>kein Muss</a:t>
+            </a:r>
+            <a:r>
+              <a:rPr lang="de-DE" dirty="0">
+                <a:sym typeface="Wingdings" panose="05000000000000000000" pitchFamily="2" charset="2"/>
+              </a:rPr>
+              <a:t>!</a:t>
             </a:r>
           </a:p>
           <a:p>
@@ -11039,7 +10919,7 @@
               <a:rPr lang="de-DE" dirty="0">
                 <a:sym typeface="Wingdings" panose="05000000000000000000" pitchFamily="2" charset="2"/>
               </a:rPr>
-              <a:t>Development Pipelines erstellen,</a:t>
+              <a:t>Development Pipelines erstellen</a:t>
             </a:r>
           </a:p>
           <a:p>
@@ -11051,7 +10931,7 @@
               <a:rPr lang="de-DE" dirty="0">
                 <a:sym typeface="Wingdings" panose="05000000000000000000" pitchFamily="2" charset="2"/>
               </a:rPr>
-              <a:t>Anwendungen entwickeln,</a:t>
+              <a:t>Anwendungen entwickeln</a:t>
             </a:r>
           </a:p>
           <a:p>
@@ -11063,7 +10943,7 @@
               <a:rPr lang="de-DE" dirty="0">
                 <a:sym typeface="Wingdings" panose="05000000000000000000" pitchFamily="2" charset="2"/>
               </a:rPr>
-              <a:t>Konfigurationen verwalten,</a:t>
+              <a:t>Konfigurationen verwalten</a:t>
             </a:r>
           </a:p>
           <a:p>
@@ -11222,6 +11102,12 @@
             </a:r>
           </a:p>
           <a:p>
+            <a:pPr marL="0" indent="0">
+              <a:buNone/>
+            </a:pPr>
+            <a:endParaRPr lang="de-DE" b="1" dirty="0"/>
+          </a:p>
+          <a:p>
             <a:pPr>
               <a:buFont typeface="Arial" panose="020B0604020202020204" pitchFamily="34" charset="0"/>
               <a:buChar char="•"/>
@@ -11289,6 +11175,13 @@
               <a:buFont typeface="Arial" panose="020B0604020202020204" pitchFamily="34" charset="0"/>
               <a:buChar char="•"/>
             </a:pPr>
+            <a:endParaRPr lang="de-DE" sz="2000" dirty="0"/>
+          </a:p>
+          <a:p>
+            <a:pPr>
+              <a:buFont typeface="Arial" panose="020B0604020202020204" pitchFamily="34" charset="0"/>
+              <a:buChar char="•"/>
+            </a:pPr>
             <a:r>
               <a:rPr lang="de-DE" sz="2000" dirty="0"/>
               <a:t>Neues Release?! PR in </a:t>
@@ -11323,7 +11216,7 @@
             </a:r>
             <a:r>
               <a:rPr lang="de-DE" sz="1800" dirty="0"/>
-              <a:t>-Operator sitzt zwischen der </a:t>
+              <a:t>-Operator zwischen der </a:t>
             </a:r>
             <a:r>
               <a:rPr lang="de-DE" sz="1800" dirty="0" err="1"/>
@@ -11345,6 +11238,13 @@
               <a:rPr lang="de-DE" sz="1800" dirty="0" err="1"/>
               <a:t>git</a:t>
             </a:r>
+            <a:endParaRPr lang="de-DE" sz="1800" dirty="0"/>
+          </a:p>
+          <a:p>
+            <a:pPr lvl="1">
+              <a:buFont typeface="Arial" panose="020B0604020202020204" pitchFamily="34" charset="0"/>
+              <a:buChar char="•"/>
+            </a:pPr>
             <a:endParaRPr lang="de-DE" sz="1800" dirty="0"/>
           </a:p>
           <a:p>
@@ -11508,7 +11408,7 @@
             </a:pPr>
             <a:r>
               <a:rPr lang="de-DE" dirty="0"/>
-              <a:t>Kein Zugriff von Außen auf das Cluster</a:t>
+              <a:t>Kein Zugriff von außen auf das Cluster</a:t>
             </a:r>
           </a:p>
           <a:p>
@@ -11586,14 +11486,6 @@
             <a:r>
               <a:rPr lang="de-DE" sz="2200" dirty="0" err="1"/>
               <a:t>git</a:t>
-            </a:r>
-            <a:r>
-              <a:rPr lang="de-DE" sz="2200" dirty="0"/>
-              <a:t> </a:t>
-            </a:r>
-            <a:r>
-              <a:rPr lang="de-DE" sz="2200" dirty="0" err="1"/>
-              <a:t>commit</a:t>
             </a:r>
             <a:r>
               <a:rPr lang="de-DE" sz="2200" dirty="0"/>
@@ -12831,6 +12723,10 @@
               <a:buChar char="•"/>
             </a:pPr>
             <a:r>
+              <a:rPr lang="de-DE" dirty="0"/>
+              <a:t>Bei </a:t>
+            </a:r>
+            <a:r>
               <a:rPr lang="de-DE" dirty="0" err="1"/>
               <a:t>CIOps</a:t>
             </a:r>
@@ -12882,6 +12778,15 @@
             </a:r>
           </a:p>
           <a:p>
+            <a:pPr lvl="1">
+              <a:buFont typeface="Arial" panose="020B0604020202020204" pitchFamily="34" charset="0"/>
+              <a:buChar char="•"/>
+            </a:pPr>
+            <a:endParaRPr lang="de-DE" dirty="0">
+              <a:sym typeface="Wingdings" panose="05000000000000000000" pitchFamily="2" charset="2"/>
+            </a:endParaRPr>
+          </a:p>
+          <a:p>
             <a:pPr>
               <a:buFont typeface="Arial" panose="020B0604020202020204" pitchFamily="34" charset="0"/>
               <a:buChar char="•"/>
@@ -12902,7 +12807,7 @@
               <a:rPr lang="de-DE" dirty="0">
                 <a:sym typeface="Wingdings" panose="05000000000000000000" pitchFamily="2" charset="2"/>
               </a:rPr>
-              <a:t>Verschiedene KMS</a:t>
+              <a:t>Möglichkeiten</a:t>
             </a:r>
           </a:p>
           <a:p>
@@ -12911,22 +12816,10 @@
               <a:buChar char="•"/>
             </a:pPr>
             <a:r>
-              <a:rPr lang="de-DE" dirty="0">
+              <a:rPr lang="de-DE" sz="2000" dirty="0">
                 <a:sym typeface="Wingdings" panose="05000000000000000000" pitchFamily="2" charset="2"/>
               </a:rPr>
-              <a:t>Proprietär – </a:t>
-            </a:r>
-            <a:r>
-              <a:rPr lang="de-DE" dirty="0" err="1">
-                <a:sym typeface="Wingdings" panose="05000000000000000000" pitchFamily="2" charset="2"/>
-              </a:rPr>
-              <a:t>idR</a:t>
-            </a:r>
-            <a:r>
-              <a:rPr lang="de-DE" dirty="0">
-                <a:sym typeface="Wingdings" panose="05000000000000000000" pitchFamily="2" charset="2"/>
-              </a:rPr>
-              <a:t>. Cloud-Anbieter (AWS, Azure, Google, …)</a:t>
+              <a:t>Cloud-Anbieter (AWS, Azure, Google, …)</a:t>
             </a:r>
           </a:p>
           <a:p>
@@ -12935,24 +12828,24 @@
               <a:buChar char="•"/>
             </a:pPr>
             <a:r>
-              <a:rPr lang="de-DE" dirty="0" err="1">
+              <a:rPr lang="de-DE" sz="2000" dirty="0" err="1">
                 <a:sym typeface="Wingdings" panose="05000000000000000000" pitchFamily="2" charset="2"/>
               </a:rPr>
-              <a:t>Hashicrop</a:t>
-            </a:r>
-            <a:r>
-              <a:rPr lang="de-DE" dirty="0">
+              <a:t>HashiCorp</a:t>
+            </a:r>
+            <a:r>
+              <a:rPr lang="de-DE" sz="2000" dirty="0">
                 <a:sym typeface="Wingdings" panose="05000000000000000000" pitchFamily="2" charset="2"/>
               </a:rPr>
               <a:t> </a:t>
             </a:r>
             <a:r>
-              <a:rPr lang="de-DE" dirty="0" err="1">
+              <a:rPr lang="de-DE" sz="2000" dirty="0" err="1">
                 <a:sym typeface="Wingdings" panose="05000000000000000000" pitchFamily="2" charset="2"/>
               </a:rPr>
               <a:t>Vault</a:t>
             </a:r>
-            <a:endParaRPr lang="de-DE" dirty="0">
+            <a:endParaRPr lang="de-DE" sz="2000" dirty="0">
               <a:sym typeface="Wingdings" panose="05000000000000000000" pitchFamily="2" charset="2"/>
             </a:endParaRPr>
           </a:p>
@@ -12980,43 +12873,49 @@
               <a:buChar char="•"/>
             </a:pPr>
             <a:r>
-              <a:rPr lang="de-DE" dirty="0">
+              <a:rPr lang="de-DE" sz="2000" dirty="0">
                 <a:sym typeface="Wingdings" panose="05000000000000000000" pitchFamily="2" charset="2"/>
               </a:rPr>
               <a:t>Operator, Container Storage Interface (CSI) Driver, Sidecar (</a:t>
             </a:r>
             <a:r>
-              <a:rPr lang="de-DE" dirty="0" err="1">
+              <a:rPr lang="de-DE" sz="2000" dirty="0" err="1">
                 <a:sym typeface="Wingdings" panose="05000000000000000000" pitchFamily="2" charset="2"/>
               </a:rPr>
               <a:t>Injector</a:t>
             </a:r>
             <a:r>
-              <a:rPr lang="de-DE" dirty="0">
+              <a:rPr lang="de-DE" sz="2000" dirty="0">
                 <a:sym typeface="Wingdings" panose="05000000000000000000" pitchFamily="2" charset="2"/>
               </a:rPr>
               <a:t>), Helm/</a:t>
             </a:r>
             <a:r>
-              <a:rPr lang="de-DE" dirty="0" err="1">
+              <a:rPr lang="de-DE" sz="2000" dirty="0" err="1">
                 <a:sym typeface="Wingdings" panose="05000000000000000000" pitchFamily="2" charset="2"/>
               </a:rPr>
               <a:t>Kustomize</a:t>
             </a:r>
             <a:r>
-              <a:rPr lang="de-DE" dirty="0">
+              <a:rPr lang="de-DE" sz="2000" dirty="0">
                 <a:sym typeface="Wingdings" panose="05000000000000000000" pitchFamily="2" charset="2"/>
               </a:rPr>
-              <a:t> Plugin, </a:t>
-            </a:r>
-            <a:r>
-              <a:rPr lang="de-DE" dirty="0" err="1">
+              <a:t> Plugin</a:t>
+            </a:r>
+          </a:p>
+          <a:p>
+            <a:pPr lvl="2">
+              <a:buFont typeface="Arial" panose="020B0604020202020204" pitchFamily="34" charset="0"/>
+              <a:buChar char="•"/>
+            </a:pPr>
+            <a:r>
+              <a:rPr lang="de-DE" sz="2000" dirty="0" err="1">
                 <a:sym typeface="Wingdings" panose="05000000000000000000" pitchFamily="2" charset="2"/>
               </a:rPr>
               <a:t>GitOps</a:t>
             </a:r>
             <a:r>
-              <a:rPr lang="de-DE" dirty="0">
+              <a:rPr lang="de-DE" sz="2000" dirty="0">
                 <a:sym typeface="Wingdings" panose="05000000000000000000" pitchFamily="2" charset="2"/>
               </a:rPr>
               <a:t> Operator: nativer Support oder Plugin</a:t>
@@ -14636,7 +14535,7 @@
             </a:pPr>
             <a:r>
               <a:rPr lang="de-DE" b="1" dirty="0"/>
-              <a:t>… im Management Cluster</a:t>
+              <a:t>Management Cluster</a:t>
             </a:r>
           </a:p>
         </p:txBody>
@@ -16284,7 +16183,7 @@
         <p:spPr bwMode="auto">
           <a:xfrm>
             <a:off x="7034552" y="4353011"/>
-            <a:ext cx="1785597" cy="230832"/>
+            <a:ext cx="2109448" cy="230832"/>
           </a:xfrm>
           <a:prstGeom prst="rect">
             <a:avLst/>
@@ -16326,7 +16225,7 @@
               <a:rPr lang="de-DE" sz="900" dirty="0">
                 <a:latin typeface="Arial" charset="0"/>
               </a:rPr>
-              <a:t> / VMs / </a:t>
+              <a:t> / VMs / bare </a:t>
             </a:r>
             <a:r>
               <a:rPr lang="de-DE" sz="900" dirty="0" err="1">
@@ -16379,17 +16278,8 @@
               <a:rPr lang="de-DE" sz="900" dirty="0">
                 <a:latin typeface="Arial" charset="0"/>
               </a:rPr>
-              <a:t>Infrastructure </a:t>
-            </a:r>
-            <a:r>
-              <a:rPr lang="de-DE" sz="900" dirty="0" err="1">
-                <a:latin typeface="Arial" charset="0"/>
-              </a:rPr>
-              <a:t>providers</a:t>
-            </a:r>
-            <a:endParaRPr lang="de-DE" sz="900" dirty="0">
-              <a:latin typeface="Arial" charset="0"/>
-            </a:endParaRPr>
+              <a:t>Infrastructure Providers</a:t>
+            </a:r>
           </a:p>
         </p:txBody>
       </p:sp>
@@ -17149,12 +17039,13 @@
             </a:pPr>
             <a:r>
               <a:rPr lang="de-DE" b="1" dirty="0"/>
-              <a:t>Best </a:t>
-            </a:r>
-            <a:r>
-              <a:rPr lang="de-DE" b="1" dirty="0" err="1"/>
-              <a:t>Practises</a:t>
-            </a:r>
+              <a:t>Best Practices</a:t>
+            </a:r>
+          </a:p>
+          <a:p>
+            <a:pPr marL="0" indent="0">
+              <a:buNone/>
+            </a:pPr>
             <a:endParaRPr lang="de-DE" b="1" dirty="0"/>
           </a:p>
           <a:p>
@@ -17379,7 +17270,7 @@
             </a:r>
             <a:r>
               <a:rPr lang="de-DE" dirty="0"/>
-              <a:t> weiterentwickeln</a:t>
+              <a:t> Operator entwickeln</a:t>
             </a:r>
           </a:p>
           <a:p>
@@ -17402,10 +17293,17 @@
           </a:p>
           <a:p>
             <a:pPr marL="857250" lvl="1" indent="-457200">
-              <a:buFont typeface="Wingdings" panose="05000000000000000000" pitchFamily="2" charset="2"/>
-              <a:buChar char="§"/>
-            </a:pPr>
-            <a:endParaRPr lang="de-DE" dirty="0"/>
+              <a:buFont typeface="Arial" panose="020B0604020202020204" pitchFamily="34" charset="0"/>
+              <a:buChar char="•"/>
+            </a:pPr>
+            <a:r>
+              <a:rPr lang="de-DE" dirty="0" err="1"/>
+              <a:t>Linting</a:t>
+            </a:r>
+            <a:r>
+              <a:rPr lang="de-DE" dirty="0"/>
+              <a:t> der Konfiguration offline</a:t>
+            </a:r>
           </a:p>
           <a:p>
             <a:pPr>
@@ -17517,6 +17415,12 @@
             </a:r>
           </a:p>
           <a:p>
+            <a:pPr marL="0" indent="0">
+              <a:buNone/>
+            </a:pPr>
+            <a:endParaRPr lang="de-DE" b="1" dirty="0"/>
+          </a:p>
+          <a:p>
             <a:pPr>
               <a:buFont typeface="Arial" panose="020B0604020202020204" pitchFamily="34" charset="0"/>
               <a:buChar char="•"/>
@@ -17608,7 +17512,7 @@
             </a:r>
             <a:r>
               <a:rPr lang="de-DE" dirty="0"/>
-              <a:t>Wird generell von abgeraten!</a:t>
+              <a:t>Generell abzuraten!</a:t>
             </a:r>
           </a:p>
           <a:p>
@@ -17804,7 +17708,7 @@
             </a:r>
             <a:r>
               <a:rPr lang="de-DE" dirty="0"/>
-              <a:t> um die Änderungen zu aktivieren</a:t>
+              <a:t>, um die Änderungen zu aktivieren</a:t>
             </a:r>
           </a:p>
           <a:p>
@@ -18681,23 +18585,7 @@
             </a:r>
             <a:r>
               <a:rPr lang="de-DE" sz="1800" kern="0" dirty="0"/>
-              <a:t> Operator aktualisiert </a:t>
-            </a:r>
-            <a:r>
-              <a:rPr lang="de-DE" sz="1800" kern="0" dirty="0" err="1"/>
-              <a:t>image</a:t>
-            </a:r>
-            <a:r>
-              <a:rPr lang="de-DE" sz="1800" kern="0" dirty="0"/>
-              <a:t> </a:t>
-            </a:r>
-            <a:r>
-              <a:rPr lang="de-DE" sz="1800" kern="0" dirty="0" err="1"/>
-              <a:t>version</a:t>
-            </a:r>
-            <a:r>
-              <a:rPr lang="de-DE" sz="1800" kern="0" dirty="0"/>
-              <a:t> in </a:t>
+              <a:t> Operator aktualisiert Image Version in </a:t>
             </a:r>
             <a:r>
               <a:rPr lang="de-DE" sz="1800" kern="0" dirty="0" err="1"/>
@@ -20227,12 +20115,12 @@
               <a:t>+ </a:t>
             </a:r>
             <a:r>
-              <a:rPr lang="de-DE" sz="900" dirty="0" err="1">
+              <a:rPr lang="de-DE" sz="900" b="1" u="sng" dirty="0" err="1">
                 <a:latin typeface="Arial" charset="0"/>
               </a:rPr>
               <a:t>watch</a:t>
             </a:r>
-            <a:endParaRPr lang="de-DE" sz="900" dirty="0">
+            <a:endParaRPr lang="de-DE" sz="900" b="1" u="sng" dirty="0">
               <a:latin typeface="Arial" charset="0"/>
             </a:endParaRPr>
           </a:p>
@@ -20277,7 +20165,13 @@
               <a:rPr lang="de-DE" sz="900" dirty="0">
                 <a:latin typeface="Arial" charset="0"/>
               </a:rPr>
-              <a:t>+ push</a:t>
+              <a:t>+ </a:t>
+            </a:r>
+            <a:r>
+              <a:rPr lang="de-DE" sz="900" b="1" u="sng" dirty="0">
+                <a:latin typeface="Arial" charset="0"/>
+              </a:rPr>
+              <a:t>push</a:t>
             </a:r>
           </a:p>
         </p:txBody>
@@ -20574,7 +20468,15 @@
             </a:r>
             <a:r>
               <a:rPr lang="de-DE" b="1" dirty="0"/>
-              <a:t>: Anwendung vs. </a:t>
+              <a:t>: </a:t>
+            </a:r>
+            <a:r>
+              <a:rPr lang="de-DE" b="1" dirty="0" err="1"/>
+              <a:t>Application</a:t>
+            </a:r>
+            <a:r>
+              <a:rPr lang="de-DE" b="1" dirty="0"/>
+              <a:t> vs. </a:t>
             </a:r>
             <a:r>
               <a:rPr lang="de-DE" b="1" dirty="0" err="1"/>
@@ -20592,7 +20494,7 @@
             </a:pPr>
             <a:r>
               <a:rPr lang="de-DE" sz="2000" dirty="0" err="1"/>
-              <a:t>Anwendungs</a:t>
+              <a:t>Application</a:t>
             </a:r>
             <a:r>
               <a:rPr lang="de-DE" sz="2000" dirty="0"/>
@@ -21523,6 +21425,9 @@
             <a:pPr eaLnBrk="1" hangingPunct="1"/>
             <a:r>
               <a:rPr lang="de-DE" sz="900" dirty="0">
+                <a:solidFill>
+                  <a:srgbClr val="0070C0"/>
+                </a:solidFill>
                 <a:latin typeface="Arial" charset="0"/>
               </a:rPr>
               <a:t>push</a:t>
@@ -23189,7 +23094,7 @@
               <a:t>push  </a:t>
             </a:r>
             <a:r>
-              <a:rPr lang="de-DE" sz="900" dirty="0" err="1">
+              <a:rPr lang="de-DE" sz="900" b="1" u="sng" dirty="0" err="1">
                 <a:latin typeface="Arial" charset="0"/>
               </a:rPr>
               <a:t>app</a:t>
@@ -23921,8 +23826,8 @@
         </p:nvSpPr>
         <p:spPr bwMode="auto">
           <a:xfrm>
-            <a:off x="1953067" y="1902024"/>
-            <a:ext cx="1418484" cy="230832"/>
+            <a:off x="1953066" y="1902024"/>
+            <a:ext cx="1558457" cy="230832"/>
           </a:xfrm>
           <a:prstGeom prst="rect">
             <a:avLst/>
@@ -23944,18 +23849,27 @@
             <a:pPr eaLnBrk="1" hangingPunct="1"/>
             <a:r>
               <a:rPr lang="de-DE" sz="900" dirty="0">
+                <a:solidFill>
+                  <a:srgbClr val="0070C0"/>
+                </a:solidFill>
                 <a:latin typeface="Arial" charset="0"/>
               </a:rPr>
               <a:t>push </a:t>
             </a:r>
             <a:r>
-              <a:rPr lang="de-DE" sz="900" dirty="0" err="1">
+              <a:rPr lang="de-DE" sz="900" b="1" u="sng" dirty="0" err="1">
+                <a:solidFill>
+                  <a:srgbClr val="0070C0"/>
+                </a:solidFill>
                 <a:latin typeface="Arial" charset="0"/>
               </a:rPr>
               <a:t>infrastructure</a:t>
             </a:r>
             <a:r>
               <a:rPr lang="de-DE" sz="900" dirty="0">
+                <a:solidFill>
+                  <a:srgbClr val="0070C0"/>
+                </a:solidFill>
                 <a:latin typeface="Arial" charset="0"/>
               </a:rPr>
               <a:t> code</a:t>
@@ -24060,13 +23974,19 @@
             </a:r>
           </a:p>
           <a:p>
+            <a:pPr marL="0" indent="0">
+              <a:buNone/>
+            </a:pPr>
+            <a:endParaRPr lang="de-DE" b="1" dirty="0"/>
+          </a:p>
+          <a:p>
             <a:pPr>
               <a:buFont typeface="Arial" panose="020B0604020202020204" pitchFamily="34" charset="0"/>
               <a:buChar char="•"/>
             </a:pPr>
             <a:r>
               <a:rPr lang="de-DE" dirty="0"/>
-              <a:t>Mehrere Repos müssen gewartet werden</a:t>
+              <a:t>Mehrere Repos (konsistent) zu warten</a:t>
             </a:r>
           </a:p>
           <a:p>
@@ -24080,7 +24000,7 @@
             </a:r>
             <a:r>
               <a:rPr lang="de-DE" dirty="0"/>
-              <a:t> und tags sind schwerer</a:t>
+              <a:t> und Tags schwerer</a:t>
             </a:r>
           </a:p>
           <a:p>
@@ -24090,7 +24010,7 @@
             </a:pPr>
             <a:r>
               <a:rPr lang="de-DE" dirty="0"/>
-              <a:t>Lokale Entwicklung wird komplizierter</a:t>
+              <a:t>Lokale Entwicklung komplizierter</a:t>
             </a:r>
           </a:p>
           <a:p>
@@ -24108,7 +24028,7 @@
             </a:r>
             <a:r>
               <a:rPr lang="de-DE" dirty="0"/>
-              <a:t>-Ansatz nur beim Anwendungscode (CI Server)</a:t>
+              <a:t>-Ansatz nur beim Anwendungscode</a:t>
             </a:r>
           </a:p>
           <a:p>
@@ -25156,7 +25076,7 @@
               <a:t>push  </a:t>
             </a:r>
             <a:r>
-              <a:rPr lang="de-DE" sz="900" dirty="0" err="1">
+              <a:rPr lang="de-DE" sz="900" b="1" u="sng" dirty="0" err="1">
                 <a:latin typeface="Arial" charset="0"/>
               </a:rPr>
               <a:t>app</a:t>
@@ -25890,8 +25810,8 @@
         </p:nvSpPr>
         <p:spPr bwMode="auto">
           <a:xfrm>
-            <a:off x="1533543" y="2012173"/>
-            <a:ext cx="1418484" cy="230832"/>
+            <a:off x="1533542" y="2012173"/>
+            <a:ext cx="1539241" cy="230832"/>
           </a:xfrm>
           <a:prstGeom prst="rect">
             <a:avLst/>
@@ -25918,7 +25838,7 @@
               <a:t>push </a:t>
             </a:r>
             <a:r>
-              <a:rPr lang="de-DE" sz="900" dirty="0" err="1">
+              <a:rPr lang="de-DE" sz="900" b="1" u="sng" dirty="0" err="1">
                 <a:latin typeface="Arial" charset="0"/>
               </a:rPr>
               <a:t>infrastructure</a:t>
@@ -25985,7 +25905,7 @@
         <p:spPr bwMode="auto">
           <a:xfrm>
             <a:off x="4193571" y="4308539"/>
-            <a:ext cx="1418484" cy="230832"/>
+            <a:ext cx="1646812" cy="230832"/>
           </a:xfrm>
           <a:prstGeom prst="rect">
             <a:avLst/>
@@ -26007,18 +25927,27 @@
             <a:pPr eaLnBrk="1" hangingPunct="1"/>
             <a:r>
               <a:rPr lang="de-DE" sz="900" dirty="0">
+                <a:solidFill>
+                  <a:srgbClr val="0070C0"/>
+                </a:solidFill>
                 <a:latin typeface="Arial" charset="0"/>
               </a:rPr>
               <a:t>push </a:t>
             </a:r>
             <a:r>
-              <a:rPr lang="de-DE" sz="900" dirty="0" err="1">
+              <a:rPr lang="de-DE" sz="900" b="1" u="sng" dirty="0" err="1">
+                <a:solidFill>
+                  <a:srgbClr val="0070C0"/>
+                </a:solidFill>
                 <a:latin typeface="Arial" charset="0"/>
               </a:rPr>
               <a:t>infrastructure</a:t>
             </a:r>
             <a:r>
               <a:rPr lang="de-DE" sz="900" dirty="0">
+                <a:solidFill>
+                  <a:srgbClr val="0070C0"/>
+                </a:solidFill>
                 <a:latin typeface="Arial" charset="0"/>
               </a:rPr>
               <a:t> code</a:t>
@@ -26137,7 +26066,7 @@
               <a:rPr lang="de-DE" dirty="0">
                 <a:sym typeface="Wingdings" panose="05000000000000000000" pitchFamily="2" charset="2"/>
               </a:rPr>
-              <a:t> Höhere Effizienz)</a:t>
+              <a:t> höhere Effizienz)</a:t>
             </a:r>
           </a:p>
           <a:p>
@@ -26242,6 +26171,26 @@
             <a:r>
               <a:rPr lang="de-DE" dirty="0"/>
               <a:t>Nachteile</a:t>
+            </a:r>
+          </a:p>
+          <a:p>
+            <a:pPr lvl="1">
+              <a:buFont typeface="Arial" panose="020B0604020202020204" pitchFamily="34" charset="0"/>
+              <a:buChar char="•"/>
+            </a:pPr>
+            <a:r>
+              <a:rPr lang="de-DE" dirty="0"/>
+              <a:t>Synchronisierung erforderlich (</a:t>
+            </a:r>
+            <a:r>
+              <a:rPr lang="de-DE" dirty="0">
+                <a:sym typeface="Wingdings" panose="05000000000000000000" pitchFamily="2" charset="2"/>
+              </a:rPr>
+              <a:t> Konsistenz</a:t>
+            </a:r>
+            <a:r>
+              <a:rPr lang="de-DE" dirty="0"/>
+              <a:t>)</a:t>
             </a:r>
           </a:p>
           <a:p>
@@ -26389,7 +26338,7 @@
             </a:pPr>
             <a:r>
               <a:rPr lang="de-DE" dirty="0"/>
-              <a:t>Helm, </a:t>
+              <a:t>Helm/</a:t>
             </a:r>
             <a:r>
               <a:rPr lang="de-DE" dirty="0" err="1"/>
@@ -26407,17 +26356,7 @@
             </a:pPr>
             <a:r>
               <a:rPr lang="de-DE" dirty="0"/>
-              <a:t>Operator für zusätzliche Tools</a:t>
-            </a:r>
-          </a:p>
-          <a:p>
-            <a:pPr lvl="1">
-              <a:buFont typeface="Arial" panose="020B0604020202020204" pitchFamily="34" charset="0"/>
-              <a:buChar char="•"/>
-            </a:pPr>
-            <a:r>
-              <a:rPr lang="de-DE" dirty="0"/>
-              <a:t>Beispielsweise Secrets</a:t>
+              <a:t>Operator für zusätzliche Tools (z.B. Secrets)</a:t>
             </a:r>
           </a:p>
           <a:p>
@@ -26447,13 +26386,8 @@
             </a:pPr>
             <a:r>
               <a:rPr lang="de-DE" dirty="0"/>
-              <a:t>Error </a:t>
-            </a:r>
-            <a:r>
-              <a:rPr lang="de-DE" dirty="0" err="1"/>
-              <a:t>handling</a:t>
-            </a:r>
-            <a:endParaRPr lang="de-DE" dirty="0"/>
+              <a:t>Error Handling</a:t>
+            </a:r>
           </a:p>
           <a:p>
             <a:pPr lvl="1">
@@ -26941,7 +26875,47 @@
                 <a:effectLst/>
                 <a:latin typeface="Inter"/>
               </a:rPr>
-              <a:t> is an operational framework that takes DevOps best practices used for application development such as version control, collaboration, compliance, and CI/CD, and applies them to infrastructure automation.</a:t>
+              <a:t> is an operational framework that takes </a:t>
+            </a:r>
+            <a:r>
+              <a:rPr lang="en-US" b="1" i="1" dirty="0">
+                <a:solidFill>
+                  <a:srgbClr val="171321"/>
+                </a:solidFill>
+                <a:effectLst/>
+                <a:latin typeface="Inter"/>
+              </a:rPr>
+              <a:t>DevOps</a:t>
+            </a:r>
+            <a:r>
+              <a:rPr lang="en-US" b="0" i="1" dirty="0">
+                <a:solidFill>
+                  <a:srgbClr val="171321"/>
+                </a:solidFill>
+                <a:effectLst/>
+                <a:latin typeface="Inter"/>
+              </a:rPr>
+              <a:t> best practices used for application development such as version control, collaboration, compliance, and CI/CD, and applies them to </a:t>
+            </a:r>
+            <a:r>
+              <a:rPr lang="en-US" b="1" i="1" dirty="0">
+                <a:solidFill>
+                  <a:srgbClr val="171321"/>
+                </a:solidFill>
+                <a:effectLst/>
+                <a:latin typeface="Inter"/>
+              </a:rPr>
+              <a:t>infrastructure automation</a:t>
+            </a:r>
+            <a:r>
+              <a:rPr lang="en-US" b="0" i="1" dirty="0">
+                <a:solidFill>
+                  <a:srgbClr val="171321"/>
+                </a:solidFill>
+                <a:effectLst/>
+                <a:latin typeface="Inter"/>
+              </a:rPr>
+              <a:t>.</a:t>
             </a:r>
             <a:r>
               <a:rPr lang="en-US" b="0" i="0" dirty="0">
@@ -27248,8 +27222,14 @@
             </a:pPr>
             <a:r>
               <a:rPr lang="de-DE" b="1" dirty="0"/>
-              <a:t>Grundprinzipien</a:t>
-            </a:r>
+              <a:t>Grundprinzipien der Konfiguration</a:t>
+            </a:r>
+          </a:p>
+          <a:p>
+            <a:pPr marL="0" indent="0">
+              <a:buNone/>
+            </a:pPr>
+            <a:endParaRPr lang="de-DE" b="1" dirty="0"/>
           </a:p>
           <a:p>
             <a:pPr marL="457200" indent="-457200">
@@ -27257,10 +27237,9 @@
               <a:buAutoNum type="arabicPeriod"/>
             </a:pPr>
             <a:r>
-              <a:rPr lang="de-DE" b="1" dirty="0" err="1"/>
-              <a:t>Declarative</a:t>
-            </a:r>
-            <a:endParaRPr lang="de-DE" b="1" dirty="0"/>
+              <a:rPr lang="de-DE" b="1" dirty="0"/>
+              <a:t>Deklarativ (statt programmatisch)</a:t>
+            </a:r>
           </a:p>
           <a:p>
             <a:pPr marL="457200" indent="-457200">
@@ -27268,18 +27247,9 @@
               <a:buAutoNum type="arabicPeriod"/>
             </a:pPr>
             <a:r>
-              <a:rPr lang="de-DE" b="1" dirty="0" err="1"/>
-              <a:t>Versioned</a:t>
-            </a:r>
-            <a:r>
               <a:rPr lang="de-DE" b="1" dirty="0"/>
-              <a:t> and </a:t>
-            </a:r>
-            <a:r>
-              <a:rPr lang="de-DE" b="1" dirty="0" err="1"/>
-              <a:t>Immutable</a:t>
-            </a:r>
-            <a:endParaRPr lang="de-DE" b="1" dirty="0"/>
+              <a:t>Versioniert und unveränderlich</a:t>
+            </a:r>
           </a:p>
           <a:p>
             <a:pPr marL="457200" indent="-457200">
@@ -27287,16 +27257,12 @@
               <a:buAutoNum type="arabicPeriod"/>
             </a:pPr>
             <a:r>
+              <a:rPr lang="de-DE" b="1" dirty="0"/>
+              <a:t>Automatische </a:t>
+            </a:r>
+            <a:r>
               <a:rPr lang="de-DE" b="1" dirty="0" err="1"/>
-              <a:t>Pulled</a:t>
-            </a:r>
-            <a:r>
-              <a:rPr lang="de-DE" b="1" dirty="0"/>
-              <a:t> </a:t>
-            </a:r>
-            <a:r>
-              <a:rPr lang="de-DE" b="1" dirty="0" err="1"/>
-              <a:t>Automatically</a:t>
+              <a:t>Pulls</a:t>
             </a:r>
             <a:endParaRPr lang="de-DE" b="1" dirty="0"/>
           </a:p>
@@ -27306,18 +27272,9 @@
               <a:buAutoNum type="arabicPeriod"/>
             </a:pPr>
             <a:r>
-              <a:rPr lang="de-DE" b="1" dirty="0" err="1"/>
-              <a:t>Continuously</a:t>
-            </a:r>
-            <a:r>
               <a:rPr lang="de-DE" b="1" dirty="0"/>
-              <a:t> </a:t>
-            </a:r>
-            <a:r>
-              <a:rPr lang="de-DE" b="1" dirty="0" err="1"/>
-              <a:t>Reconciled</a:t>
-            </a:r>
-            <a:endParaRPr lang="de-DE" b="1" dirty="0"/>
+              <a:t>Kontinuierliche Anpassung</a:t>
+            </a:r>
           </a:p>
           <a:p>
             <a:pPr marL="457200" indent="-457200">

</xml_diff>